<commit_message>
Update design for imported data obj view
</commit_message>
<xml_diff>
--- a/app_sketch/app_UI.pptx
+++ b/app_sketch/app_UI.pptx
@@ -109,6 +109,11 @@
       </a:defRPr>
     </a:lvl9pPr>
   </p:defaultTextStyle>
+  <p:extLst>
+    <p:ext uri="{EFAFB233-063F-42B5-8137-9DF3F51BA10A}">
+      <p15:sldGuideLst xmlns:p15="http://schemas.microsoft.com/office/powerpoint/2012/main"/>
+    </p:ext>
+  </p:extLst>
 </p:presentation>
 </file>
 
@@ -261,7 +266,7 @@
           <a:p>
             <a:fld id="{A3D53967-4F66-4DA8-A928-79230AACDC01}" type="datetimeFigureOut">
               <a:rPr lang="en-MY" smtClean="0"/>
-              <a:t>14/1/2025</a:t>
+              <a:t>9/2/2025</a:t>
             </a:fld>
             <a:endParaRPr lang="en-MY"/>
           </a:p>
@@ -461,7 +466,7 @@
           <a:p>
             <a:fld id="{A3D53967-4F66-4DA8-A928-79230AACDC01}" type="datetimeFigureOut">
               <a:rPr lang="en-MY" smtClean="0"/>
-              <a:t>14/1/2025</a:t>
+              <a:t>9/2/2025</a:t>
             </a:fld>
             <a:endParaRPr lang="en-MY"/>
           </a:p>
@@ -671,7 +676,7 @@
           <a:p>
             <a:fld id="{A3D53967-4F66-4DA8-A928-79230AACDC01}" type="datetimeFigureOut">
               <a:rPr lang="en-MY" smtClean="0"/>
-              <a:t>14/1/2025</a:t>
+              <a:t>9/2/2025</a:t>
             </a:fld>
             <a:endParaRPr lang="en-MY"/>
           </a:p>
@@ -871,7 +876,7 @@
           <a:p>
             <a:fld id="{A3D53967-4F66-4DA8-A928-79230AACDC01}" type="datetimeFigureOut">
               <a:rPr lang="en-MY" smtClean="0"/>
-              <a:t>14/1/2025</a:t>
+              <a:t>9/2/2025</a:t>
             </a:fld>
             <a:endParaRPr lang="en-MY"/>
           </a:p>
@@ -1147,7 +1152,7 @@
           <a:p>
             <a:fld id="{A3D53967-4F66-4DA8-A928-79230AACDC01}" type="datetimeFigureOut">
               <a:rPr lang="en-MY" smtClean="0"/>
-              <a:t>14/1/2025</a:t>
+              <a:t>9/2/2025</a:t>
             </a:fld>
             <a:endParaRPr lang="en-MY"/>
           </a:p>
@@ -1415,7 +1420,7 @@
           <a:p>
             <a:fld id="{A3D53967-4F66-4DA8-A928-79230AACDC01}" type="datetimeFigureOut">
               <a:rPr lang="en-MY" smtClean="0"/>
-              <a:t>14/1/2025</a:t>
+              <a:t>9/2/2025</a:t>
             </a:fld>
             <a:endParaRPr lang="en-MY"/>
           </a:p>
@@ -1830,7 +1835,7 @@
           <a:p>
             <a:fld id="{A3D53967-4F66-4DA8-A928-79230AACDC01}" type="datetimeFigureOut">
               <a:rPr lang="en-MY" smtClean="0"/>
-              <a:t>14/1/2025</a:t>
+              <a:t>9/2/2025</a:t>
             </a:fld>
             <a:endParaRPr lang="en-MY"/>
           </a:p>
@@ -1972,7 +1977,7 @@
           <a:p>
             <a:fld id="{A3D53967-4F66-4DA8-A928-79230AACDC01}" type="datetimeFigureOut">
               <a:rPr lang="en-MY" smtClean="0"/>
-              <a:t>14/1/2025</a:t>
+              <a:t>9/2/2025</a:t>
             </a:fld>
             <a:endParaRPr lang="en-MY"/>
           </a:p>
@@ -2085,7 +2090,7 @@
           <a:p>
             <a:fld id="{A3D53967-4F66-4DA8-A928-79230AACDC01}" type="datetimeFigureOut">
               <a:rPr lang="en-MY" smtClean="0"/>
-              <a:t>14/1/2025</a:t>
+              <a:t>9/2/2025</a:t>
             </a:fld>
             <a:endParaRPr lang="en-MY"/>
           </a:p>
@@ -2398,7 +2403,7 @@
           <a:p>
             <a:fld id="{A3D53967-4F66-4DA8-A928-79230AACDC01}" type="datetimeFigureOut">
               <a:rPr lang="en-MY" smtClean="0"/>
-              <a:t>14/1/2025</a:t>
+              <a:t>9/2/2025</a:t>
             </a:fld>
             <a:endParaRPr lang="en-MY"/>
           </a:p>
@@ -2687,7 +2692,7 @@
           <a:p>
             <a:fld id="{A3D53967-4F66-4DA8-A928-79230AACDC01}" type="datetimeFigureOut">
               <a:rPr lang="en-MY" smtClean="0"/>
-              <a:t>14/1/2025</a:t>
+              <a:t>9/2/2025</a:t>
             </a:fld>
             <a:endParaRPr lang="en-MY"/>
           </a:p>
@@ -2930,7 +2935,7 @@
           <a:p>
             <a:fld id="{A3D53967-4F66-4DA8-A928-79230AACDC01}" type="datetimeFigureOut">
               <a:rPr lang="en-MY" smtClean="0"/>
-              <a:t>14/1/2025</a:t>
+              <a:t>9/2/2025</a:t>
             </a:fld>
             <a:endParaRPr lang="en-MY"/>
           </a:p>
@@ -4554,14 +4559,14 @@
           <p:nvPr>
             <p:extLst>
               <p:ext uri="{D42A27DB-BD31-4B8C-83A1-F6EECF244321}">
-                <p14:modId xmlns:p14="http://schemas.microsoft.com/office/powerpoint/2010/main" val="1593988856"/>
+                <p14:modId xmlns:p14="http://schemas.microsoft.com/office/powerpoint/2010/main" val="1555143934"/>
               </p:ext>
             </p:extLst>
           </p:nvPr>
         </p:nvGraphicFramePr>
         <p:xfrm>
-          <a:off x="3214448" y="2089369"/>
-          <a:ext cx="8127999" cy="1854200"/>
+          <a:off x="3140421" y="1162269"/>
+          <a:ext cx="7768369" cy="1854200"/>
         </p:xfrm>
         <a:graphic>
           <a:graphicData uri="http://schemas.openxmlformats.org/drawingml/2006/table">
@@ -4570,24 +4575,31 @@
                 <a:tableStyleId>{5C22544A-7EE6-4342-B048-85BDC9FD1C3A}</a:tableStyleId>
               </a:tblPr>
               <a:tblGrid>
-                <a:gridCol w="1159859">
+                <a:gridCol w="722826">
                   <a:extLst>
                     <a:ext uri="{9D8B030D-6E8A-4147-A177-3AD203B41FA5}">
                       <a16:colId xmlns:a16="http://schemas.microsoft.com/office/drawing/2014/main" val="4125065112"/>
                     </a:ext>
                   </a:extLst>
                 </a:gridCol>
-                <a:gridCol w="4258807">
+                <a:gridCol w="1639563">
                   <a:extLst>
                     <a:ext uri="{9D8B030D-6E8A-4147-A177-3AD203B41FA5}">
                       <a16:colId xmlns:a16="http://schemas.microsoft.com/office/drawing/2014/main" val="1408987461"/>
                     </a:ext>
                   </a:extLst>
                 </a:gridCol>
-                <a:gridCol w="2709333">
+                <a:gridCol w="3430878">
                   <a:extLst>
                     <a:ext uri="{9D8B030D-6E8A-4147-A177-3AD203B41FA5}">
                       <a16:colId xmlns:a16="http://schemas.microsoft.com/office/drawing/2014/main" val="1429941472"/>
+                    </a:ext>
+                  </a:extLst>
+                </a:gridCol>
+                <a:gridCol w="1975102">
+                  <a:extLst>
+                    <a:ext uri="{9D8B030D-6E8A-4147-A177-3AD203B41FA5}">
+                      <a16:colId xmlns:a16="http://schemas.microsoft.com/office/drawing/2014/main" val="3004836408"/>
                     </a:ext>
                   </a:extLst>
                 </a:gridCol>
@@ -4626,7 +4638,20 @@
                     <a:p>
                       <a:r>
                         <a:rPr lang="en-MY" dirty="0"/>
-                        <a:t>Source</a:t>
+                        <a:t>Type</a:t>
+                      </a:r>
+                    </a:p>
+                  </a:txBody>
+                  <a:tcPr/>
+                </a:tc>
+                <a:tc>
+                  <a:txBody>
+                    <a:bodyPr/>
+                    <a:lstStyle/>
+                    <a:p>
+                      <a:r>
+                        <a:rPr lang="en-MY" dirty="0"/>
+                        <a:t>Size (mb)</a:t>
                       </a:r>
                     </a:p>
                   </a:txBody>
@@ -4678,6 +4703,16 @@
                   </a:txBody>
                   <a:tcPr/>
                 </a:tc>
+                <a:tc>
+                  <a:txBody>
+                    <a:bodyPr/>
+                    <a:lstStyle/>
+                    <a:p>
+                      <a:endParaRPr lang="en-MY" dirty="0"/>
+                    </a:p>
+                  </a:txBody>
+                  <a:tcPr/>
+                </a:tc>
                 <a:extLst>
                   <a:ext uri="{0D108BD9-81ED-4DB2-BD59-A6C34878D82A}">
                     <a16:rowId xmlns:a16="http://schemas.microsoft.com/office/drawing/2014/main" val="1631540058"/>
@@ -4720,6 +4755,16 @@
                         <a:rPr lang="en-MY" dirty="0"/>
                         <a:t>PDF</a:t>
                       </a:r>
+                    </a:p>
+                  </a:txBody>
+                  <a:tcPr/>
+                </a:tc>
+                <a:tc>
+                  <a:txBody>
+                    <a:bodyPr/>
+                    <a:lstStyle/>
+                    <a:p>
+                      <a:endParaRPr lang="en-MY" dirty="0"/>
                     </a:p>
                   </a:txBody>
                   <a:tcPr/>
@@ -4774,6 +4819,16 @@
                   </a:txBody>
                   <a:tcPr/>
                 </a:tc>
+                <a:tc>
+                  <a:txBody>
+                    <a:bodyPr/>
+                    <a:lstStyle/>
+                    <a:p>
+                      <a:endParaRPr lang="en-MY" dirty="0"/>
+                    </a:p>
+                  </a:txBody>
+                  <a:tcPr/>
+                </a:tc>
                 <a:extLst>
                   <a:ext uri="{0D108BD9-81ED-4DB2-BD59-A6C34878D82A}">
                     <a16:rowId xmlns:a16="http://schemas.microsoft.com/office/drawing/2014/main" val="4011298474"/>
@@ -4822,6 +4877,16 @@
                   </a:txBody>
                   <a:tcPr/>
                 </a:tc>
+                <a:tc>
+                  <a:txBody>
+                    <a:bodyPr/>
+                    <a:lstStyle/>
+                    <a:p>
+                      <a:endParaRPr lang="en-MY" dirty="0"/>
+                    </a:p>
+                  </a:txBody>
+                  <a:tcPr/>
+                </a:tc>
                 <a:extLst>
                   <a:ext uri="{0D108BD9-81ED-4DB2-BD59-A6C34878D82A}">
                     <a16:rowId xmlns:a16="http://schemas.microsoft.com/office/drawing/2014/main" val="3203087391"/>
@@ -4846,7 +4911,7 @@
         </p:nvSpPr>
         <p:spPr>
           <a:xfrm>
-            <a:off x="3316472" y="1494860"/>
+            <a:off x="3140421" y="659953"/>
             <a:ext cx="3543599" cy="369332"/>
           </a:xfrm>
           <a:prstGeom prst="rect">
@@ -4889,10 +4954,10 @@
         </p:nvGrpSpPr>
         <p:grpSpPr>
           <a:xfrm>
-            <a:off x="2961043" y="559396"/>
-            <a:ext cx="2277562" cy="680097"/>
+            <a:off x="3128522" y="3376234"/>
+            <a:ext cx="2991268" cy="680097"/>
             <a:chOff x="9543897" y="597752"/>
-            <a:chExt cx="2277562" cy="680097"/>
+            <a:chExt cx="2991268" cy="680097"/>
           </a:xfrm>
         </p:grpSpPr>
         <p:sp>
@@ -5007,7 +5072,7 @@
           <p:spPr>
             <a:xfrm>
               <a:off x="9543897" y="597752"/>
-              <a:ext cx="1307346" cy="307777"/>
+              <a:ext cx="2991268" cy="307777"/>
             </a:xfrm>
             <a:prstGeom prst="rect">
               <a:avLst/>
@@ -5022,12 +5087,61 @@
             <a:p>
               <a:r>
                 <a:rPr lang="en-MY" sz="1400" dirty="0"/>
-                <a:t>Active Dataset</a:t>
+                <a:t>Activate Dataset for Further Analysis</a:t>
               </a:r>
             </a:p>
           </p:txBody>
         </p:sp>
       </p:grpSp>
+      <p:sp>
+        <p:nvSpPr>
+          <p:cNvPr id="9" name="Rectangle 8">
+            <a:extLst>
+              <a:ext uri="{FF2B5EF4-FFF2-40B4-BE49-F238E27FC236}">
+                <a16:creationId xmlns:a16="http://schemas.microsoft.com/office/drawing/2014/main" id="{9ADAB16C-FF43-DA6A-CE2A-4B4896FDE459}"/>
+              </a:ext>
+            </a:extLst>
+          </p:cNvPr>
+          <p:cNvSpPr/>
+          <p:nvPr/>
+        </p:nvSpPr>
+        <p:spPr>
+          <a:xfrm>
+            <a:off x="6236208" y="3684011"/>
+            <a:ext cx="549703" cy="369332"/>
+          </a:xfrm>
+          <a:prstGeom prst="rect">
+            <a:avLst/>
+          </a:prstGeom>
+        </p:spPr>
+        <p:style>
+          <a:lnRef idx="2">
+            <a:schemeClr val="accent1">
+              <a:shade val="15000"/>
+            </a:schemeClr>
+          </a:lnRef>
+          <a:fillRef idx="1">
+            <a:schemeClr val="accent1"/>
+          </a:fillRef>
+          <a:effectRef idx="0">
+            <a:schemeClr val="accent1"/>
+          </a:effectRef>
+          <a:fontRef idx="minor">
+            <a:schemeClr val="lt1"/>
+          </a:fontRef>
+        </p:style>
+        <p:txBody>
+          <a:bodyPr rtlCol="0" anchor="ctr"/>
+          <a:lstStyle/>
+          <a:p>
+            <a:pPr algn="ctr"/>
+            <a:r>
+              <a:rPr lang="en-MY" dirty="0"/>
+              <a:t>Go!</a:t>
+            </a:r>
+          </a:p>
+        </p:txBody>
+      </p:sp>
     </p:spTree>
     <p:extLst>
       <p:ext uri="{BB962C8B-B14F-4D97-AF65-F5344CB8AC3E}">

</xml_diff>